<commit_message>
update show mix histogram
</commit_message>
<xml_diff>
--- a/slide.pptx
+++ b/slide.pptx
@@ -232,7 +232,7 @@
           <a:p>
             <a:fld id="{48B45424-6BAC-416C-8F6C-5F9DE854A36B}" type="datetimeFigureOut">
               <a:rPr lang="en-US" smtClean="0"/>
-              <a:t>7/26/22</a:t>
+              <a:t>7/27/22</a:t>
             </a:fld>
             <a:endParaRPr lang="en-US"/>
           </a:p>
@@ -410,7 +410,7 @@
           <a:p>
             <a:fld id="{6B733702-C25A-40B9-9167-54BAA79B29B0}" type="datetimeFigureOut">
               <a:rPr lang="en-US" smtClean="0"/>
-              <a:t>7/26/22</a:t>
+              <a:t>7/27/22</a:t>
             </a:fld>
             <a:endParaRPr lang="en-US"/>
           </a:p>
@@ -754,7 +754,7 @@
             <a:fld id="{58E92B09-5AF4-4E86-A8BE-E866F0E2C017}" type="datetime1">
               <a:rPr lang="en-US" smtClean="0"/>
               <a:pPr/>
-              <a:t>7/26/22</a:t>
+              <a:t>7/27/22</a:t>
             </a:fld>
             <a:endParaRPr lang="en-US"/>
           </a:p>
@@ -946,7 +946,7 @@
             <a:fld id="{F70EAA40-3A53-4A3D-924A-D38F1059C7D5}" type="datetime1">
               <a:rPr lang="en-US" smtClean="0"/>
               <a:pPr/>
-              <a:t>7/26/22</a:t>
+              <a:t>7/27/22</a:t>
             </a:fld>
             <a:endParaRPr lang="en-US"/>
           </a:p>
@@ -1286,7 +1286,7 @@
             <a:fld id="{B3ACFEBC-8634-4116-B617-2BE5C2034C2C}" type="datetime1">
               <a:rPr lang="en-US" smtClean="0"/>
               <a:pPr/>
-              <a:t>7/26/22</a:t>
+              <a:t>7/27/22</a:t>
             </a:fld>
             <a:endParaRPr lang="en-US"/>
           </a:p>
@@ -1761,7 +1761,7 @@
             <a:fld id="{8CDB0C24-DFE0-41C5-B02D-FC32F5C22F7C}" type="datetime1">
               <a:rPr lang="en-US" smtClean="0"/>
               <a:pPr/>
-              <a:t>7/26/22</a:t>
+              <a:t>7/27/22</a:t>
             </a:fld>
             <a:endParaRPr lang="en-US"/>
           </a:p>
@@ -1951,7 +1951,7 @@
             <a:fld id="{EEBFCEF3-2DDE-476B-8A96-303EC557333C}" type="datetime1">
               <a:rPr lang="en-US" smtClean="0"/>
               <a:pPr/>
-              <a:t>7/26/22</a:t>
+              <a:t>7/27/22</a:t>
             </a:fld>
             <a:endParaRPr lang="en-US"/>
           </a:p>
@@ -2291,7 +2291,7 @@
             <a:fld id="{19A9EFEF-A194-4819-82D7-1112425D0E86}" type="datetime1">
               <a:rPr lang="en-US" smtClean="0"/>
               <a:pPr/>
-              <a:t>7/26/22</a:t>
+              <a:t>7/27/22</a:t>
             </a:fld>
             <a:endParaRPr lang="en-US"/>
           </a:p>
@@ -2616,7 +2616,7 @@
             <a:fld id="{82F65D4C-DEE4-4C7B-91C4-D6D57A523E98}" type="datetime1">
               <a:rPr lang="en-US" smtClean="0"/>
               <a:pPr/>
-              <a:t>7/26/22</a:t>
+              <a:t>7/27/22</a:t>
             </a:fld>
             <a:endParaRPr lang="en-US"/>
           </a:p>
@@ -5326,7 +5326,7 @@
         </p:blipFill>
         <p:spPr>
           <a:xfrm>
-            <a:off x="3815741" y="1032511"/>
+            <a:off x="3815741" y="950068"/>
             <a:ext cx="3707146" cy="2780360"/>
           </a:xfrm>
           <a:prstGeom prst="rect">
@@ -5362,7 +5362,7 @@
         </p:blipFill>
         <p:spPr>
           <a:xfrm>
-            <a:off x="7403867" y="1032511"/>
+            <a:off x="7578580" y="950068"/>
             <a:ext cx="3707146" cy="2780360"/>
           </a:xfrm>
           <a:prstGeom prst="rect">
@@ -5454,7 +5454,7 @@
         </p:nvSpPr>
         <p:spPr>
           <a:xfrm>
-            <a:off x="8605927" y="3831481"/>
+            <a:off x="9204648" y="3812871"/>
             <a:ext cx="1824054" cy="369332"/>
           </a:xfrm>
           <a:prstGeom prst="rect">
@@ -5907,7 +5907,7 @@
             </a:pPr>
             <a:r>
               <a:rPr lang="en-VN" dirty="0"/>
-              <a:t>	- Chưa dữ được những bộ khung của lịch sử của device tốt cho vòng lặp tiếp theo </a:t>
+              <a:t>	- Chưa giữ được những bộ khung của lịch sử của device tốt cho vòng lặp tiếp theo </a:t>
             </a:r>
           </a:p>
         </p:txBody>

</xml_diff>